<commit_message>
Fitting seems to work but needs more debugging. We also need to display the result of the fitting live
</commit_message>
<xml_diff>
--- a/docs/Fitting equations .pptx
+++ b/docs/Fitting equations .pptx
@@ -4830,6 +4830,13 @@
   <p:clrMapOvr>
     <a:masterClrMapping/>
   </p:clrMapOvr>
+  <p:timing>
+    <p:tnLst>
+      <p:par>
+        <p:cTn id="1" dur="indefinite" restart="never" nodeType="tmRoot"/>
+      </p:par>
+    </p:tnLst>
+  </p:timing>
 </p:sld>
 </file>
 

</xml_diff>